<commit_message>
Additional refactoring. Plotting now depends on Core. Added new threaded opengl rendering mode.
</commit_message>
<xml_diff>
--- a/icons/splashscreens.pptx
+++ b/icons/splashscreens.pptx
@@ -9,6 +9,7 @@
     <p:sldId id="257" r:id="rId3"/>
     <p:sldId id="258" r:id="rId4"/>
     <p:sldId id="259" r:id="rId5"/>
+    <p:sldId id="260" r:id="rId6"/>
   </p:sldIdLst>
   <p:sldSz cx="12192000" cy="6858000"/>
   <p:notesSz cx="6858000" cy="9144000"/>
@@ -266,7 +267,7 @@
           <a:p>
             <a:fld id="{D95F3F3F-3E05-4475-BDF7-9F1F10448BC5}" type="datetimeFigureOut">
               <a:rPr lang="fr-FR" smtClean="0"/>
-              <a:t>28/02/2023</a:t>
+              <a:t>19/10/2023</a:t>
             </a:fld>
             <a:endParaRPr lang="fr-FR"/>
           </a:p>
@@ -464,7 +465,7 @@
           <a:p>
             <a:fld id="{D95F3F3F-3E05-4475-BDF7-9F1F10448BC5}" type="datetimeFigureOut">
               <a:rPr lang="fr-FR" smtClean="0"/>
-              <a:t>28/02/2023</a:t>
+              <a:t>19/10/2023</a:t>
             </a:fld>
             <a:endParaRPr lang="fr-FR"/>
           </a:p>
@@ -672,7 +673,7 @@
           <a:p>
             <a:fld id="{D95F3F3F-3E05-4475-BDF7-9F1F10448BC5}" type="datetimeFigureOut">
               <a:rPr lang="fr-FR" smtClean="0"/>
-              <a:t>28/02/2023</a:t>
+              <a:t>19/10/2023</a:t>
             </a:fld>
             <a:endParaRPr lang="fr-FR"/>
           </a:p>
@@ -870,7 +871,7 @@
           <a:p>
             <a:fld id="{D95F3F3F-3E05-4475-BDF7-9F1F10448BC5}" type="datetimeFigureOut">
               <a:rPr lang="fr-FR" smtClean="0"/>
-              <a:t>28/02/2023</a:t>
+              <a:t>19/10/2023</a:t>
             </a:fld>
             <a:endParaRPr lang="fr-FR"/>
           </a:p>
@@ -1145,7 +1146,7 @@
           <a:p>
             <a:fld id="{D95F3F3F-3E05-4475-BDF7-9F1F10448BC5}" type="datetimeFigureOut">
               <a:rPr lang="fr-FR" smtClean="0"/>
-              <a:t>28/02/2023</a:t>
+              <a:t>19/10/2023</a:t>
             </a:fld>
             <a:endParaRPr lang="fr-FR"/>
           </a:p>
@@ -1410,7 +1411,7 @@
           <a:p>
             <a:fld id="{D95F3F3F-3E05-4475-BDF7-9F1F10448BC5}" type="datetimeFigureOut">
               <a:rPr lang="fr-FR" smtClean="0"/>
-              <a:t>28/02/2023</a:t>
+              <a:t>19/10/2023</a:t>
             </a:fld>
             <a:endParaRPr lang="fr-FR"/>
           </a:p>
@@ -1822,7 +1823,7 @@
           <a:p>
             <a:fld id="{D95F3F3F-3E05-4475-BDF7-9F1F10448BC5}" type="datetimeFigureOut">
               <a:rPr lang="fr-FR" smtClean="0"/>
-              <a:t>28/02/2023</a:t>
+              <a:t>19/10/2023</a:t>
             </a:fld>
             <a:endParaRPr lang="fr-FR"/>
           </a:p>
@@ -1963,7 +1964,7 @@
           <a:p>
             <a:fld id="{D95F3F3F-3E05-4475-BDF7-9F1F10448BC5}" type="datetimeFigureOut">
               <a:rPr lang="fr-FR" smtClean="0"/>
-              <a:t>28/02/2023</a:t>
+              <a:t>19/10/2023</a:t>
             </a:fld>
             <a:endParaRPr lang="fr-FR"/>
           </a:p>
@@ -2076,7 +2077,7 @@
           <a:p>
             <a:fld id="{D95F3F3F-3E05-4475-BDF7-9F1F10448BC5}" type="datetimeFigureOut">
               <a:rPr lang="fr-FR" smtClean="0"/>
-              <a:t>28/02/2023</a:t>
+              <a:t>19/10/2023</a:t>
             </a:fld>
             <a:endParaRPr lang="fr-FR"/>
           </a:p>
@@ -2387,7 +2388,7 @@
           <a:p>
             <a:fld id="{D95F3F3F-3E05-4475-BDF7-9F1F10448BC5}" type="datetimeFigureOut">
               <a:rPr lang="fr-FR" smtClean="0"/>
-              <a:t>28/02/2023</a:t>
+              <a:t>19/10/2023</a:t>
             </a:fld>
             <a:endParaRPr lang="fr-FR"/>
           </a:p>
@@ -2675,7 +2676,7 @@
           <a:p>
             <a:fld id="{D95F3F3F-3E05-4475-BDF7-9F1F10448BC5}" type="datetimeFigureOut">
               <a:rPr lang="fr-FR" smtClean="0"/>
-              <a:t>28/02/2023</a:t>
+              <a:t>19/10/2023</a:t>
             </a:fld>
             <a:endParaRPr lang="fr-FR"/>
           </a:p>
@@ -2916,7 +2917,7 @@
           <a:p>
             <a:fld id="{D95F3F3F-3E05-4475-BDF7-9F1F10448BC5}" type="datetimeFigureOut">
               <a:rPr lang="fr-FR" smtClean="0"/>
-              <a:t>28/02/2023</a:t>
+              <a:t>19/10/2023</a:t>
             </a:fld>
             <a:endParaRPr lang="fr-FR"/>
           </a:p>
@@ -3793,7 +3794,7 @@
         </p:blipFill>
         <p:spPr>
           <a:xfrm>
-            <a:off x="5302655" y="3146384"/>
+            <a:off x="4330903" y="2939677"/>
             <a:ext cx="480925" cy="458024"/>
           </a:xfrm>
           <a:prstGeom prst="rect">
@@ -4854,17 +4855,7 @@
                 <a:latin typeface="+mj-lt"/>
                 <a:cs typeface="Arial" panose="020B0604020202020204" pitchFamily="34" charset="0"/>
               </a:rPr>
-              <a:t> </a:t>
-            </a:r>
-            <a:r>
-              <a:rPr lang="fr-FR" sz="1050" dirty="0" smtClean="0">
-                <a:solidFill>
-                  <a:schemeClr val="bg1"/>
-                </a:solidFill>
-                <a:latin typeface="+mj-lt"/>
-                <a:cs typeface="Arial" panose="020B0604020202020204" pitchFamily="34" charset="0"/>
-              </a:rPr>
-              <a:t>2023</a:t>
+              <a:t> 2023</a:t>
             </a:r>
             <a:endParaRPr lang="fr-FR" sz="1050" dirty="0">
               <a:solidFill>
@@ -5242,6 +5233,155 @@
           </a:prstGeom>
         </p:spPr>
       </p:pic>
+      <p:pic>
+        <p:nvPicPr>
+          <p:cNvPr id="50" name="Image 49">
+            <a:extLst>
+              <a:ext uri="{FF2B5EF4-FFF2-40B4-BE49-F238E27FC236}">
+                <a16:creationId xmlns:a16="http://schemas.microsoft.com/office/drawing/2014/main" id="{77743310-56F6-461D-80CB-F6071C359118}"/>
+              </a:ext>
+            </a:extLst>
+          </p:cNvPr>
+          <p:cNvPicPr>
+            <a:picLocks noChangeAspect="1"/>
+          </p:cNvPicPr>
+          <p:nvPr/>
+        </p:nvPicPr>
+        <p:blipFill>
+          <a:blip r:embed="rId3" cstate="hqprint">
+            <a:extLst>
+              <a:ext uri="{28A0092B-C50C-407E-A947-70E740481C1C}">
+                <a14:useLocalDpi xmlns:a14="http://schemas.microsoft.com/office/drawing/2010/main" val="0"/>
+              </a:ext>
+            </a:extLst>
+          </a:blip>
+          <a:stretch>
+            <a:fillRect/>
+          </a:stretch>
+        </p:blipFill>
+        <p:spPr>
+          <a:xfrm>
+            <a:off x="4881548" y="2964706"/>
+            <a:ext cx="494322" cy="388289"/>
+          </a:xfrm>
+          <a:prstGeom prst="rect">
+            <a:avLst/>
+          </a:prstGeom>
+        </p:spPr>
+      </p:pic>
+      <p:sp>
+        <p:nvSpPr>
+          <p:cNvPr id="53" name="ZoneTexte 52">
+            <a:extLst>
+              <a:ext uri="{FF2B5EF4-FFF2-40B4-BE49-F238E27FC236}">
+                <a16:creationId xmlns:a16="http://schemas.microsoft.com/office/drawing/2014/main" id="{1DD6F4B8-9F34-4C2C-B716-EB10F72BD339}"/>
+              </a:ext>
+            </a:extLst>
+          </p:cNvPr>
+          <p:cNvSpPr txBox="1"/>
+          <p:nvPr/>
+        </p:nvSpPr>
+        <p:spPr>
+          <a:xfrm>
+            <a:off x="5607465" y="2720095"/>
+            <a:ext cx="1272579" cy="369332"/>
+          </a:xfrm>
+          <a:prstGeom prst="rect">
+            <a:avLst/>
+          </a:prstGeom>
+          <a:noFill/>
+        </p:spPr>
+        <p:txBody>
+          <a:bodyPr wrap="square" rtlCol="0">
+            <a:spAutoFit/>
+          </a:bodyPr>
+          <a:lstStyle/>
+          <a:p>
+            <a:r>
+              <a:rPr lang="fr-FR" b="1" dirty="0" err="1">
+                <a:solidFill>
+                  <a:schemeClr val="tx1">
+                    <a:lumMod val="95000"/>
+                    <a:lumOff val="5000"/>
+                  </a:schemeClr>
+                </a:solidFill>
+                <a:latin typeface="+mj-lt"/>
+                <a:cs typeface="Arial" panose="020B0604020202020204" pitchFamily="34" charset="0"/>
+              </a:rPr>
+              <a:t>ThermaVIP</a:t>
+            </a:r>
+            <a:r>
+              <a:rPr lang="fr-FR" b="1" dirty="0">
+                <a:solidFill>
+                  <a:schemeClr val="tx1">
+                    <a:lumMod val="95000"/>
+                    <a:lumOff val="5000"/>
+                  </a:schemeClr>
+                </a:solidFill>
+                <a:latin typeface="+mj-lt"/>
+                <a:cs typeface="Arial" panose="020B0604020202020204" pitchFamily="34" charset="0"/>
+              </a:rPr>
+              <a:t> </a:t>
+            </a:r>
+          </a:p>
+        </p:txBody>
+      </p:sp>
+      <p:sp>
+        <p:nvSpPr>
+          <p:cNvPr id="54" name="ZoneTexte 53">
+            <a:extLst>
+              <a:ext uri="{FF2B5EF4-FFF2-40B4-BE49-F238E27FC236}">
+                <a16:creationId xmlns:a16="http://schemas.microsoft.com/office/drawing/2014/main" id="{1DD6F4B8-9F34-4C2C-B716-EB10F72BD339}"/>
+              </a:ext>
+            </a:extLst>
+          </p:cNvPr>
+          <p:cNvSpPr txBox="1"/>
+          <p:nvPr/>
+        </p:nvSpPr>
+        <p:spPr>
+          <a:xfrm>
+            <a:off x="5393409" y="3366907"/>
+            <a:ext cx="1272579" cy="369332"/>
+          </a:xfrm>
+          <a:prstGeom prst="rect">
+            <a:avLst/>
+          </a:prstGeom>
+          <a:noFill/>
+        </p:spPr>
+        <p:txBody>
+          <a:bodyPr wrap="square" rtlCol="0">
+            <a:spAutoFit/>
+          </a:bodyPr>
+          <a:lstStyle/>
+          <a:p>
+            <a:r>
+              <a:rPr lang="fr-FR" b="1" kern="1500" spc="100" dirty="0" smtClean="0">
+                <a:solidFill>
+                  <a:schemeClr val="tx1">
+                    <a:lumMod val="95000"/>
+                    <a:lumOff val="5000"/>
+                  </a:schemeClr>
+                </a:solidFill>
+                <a:latin typeface="Calibri" panose="020F0502020204030204" pitchFamily="34" charset="0"/>
+                <a:ea typeface="Cambria" panose="02040503050406030204" pitchFamily="18" charset="0"/>
+                <a:cs typeface="Calibri" panose="020F0502020204030204" pitchFamily="34" charset="0"/>
+              </a:rPr>
+              <a:t>THERMA </a:t>
+            </a:r>
+            <a:endParaRPr lang="fr-FR" b="1" kern="1500" spc="100" dirty="0">
+              <a:solidFill>
+                <a:schemeClr val="tx1">
+                  <a:lumMod val="95000"/>
+                  <a:lumOff val="5000"/>
+                </a:schemeClr>
+              </a:solidFill>
+              <a:latin typeface="Calibri" panose="020F0502020204030204" pitchFamily="34" charset="0"/>
+              <a:ea typeface="Cambria" panose="02040503050406030204" pitchFamily="18" charset="0"/>
+              <a:cs typeface="Calibri" panose="020F0502020204030204" pitchFamily="34" charset="0"/>
+            </a:endParaRPr>
+          </a:p>
+        </p:txBody>
+      </p:sp>
     </p:spTree>
     <p:extLst>
       <p:ext uri="{BB962C8B-B14F-4D97-AF65-F5344CB8AC3E}">
@@ -6024,6 +6164,608 @@
     <p:extLst>
       <p:ext uri="{BB962C8B-B14F-4D97-AF65-F5344CB8AC3E}">
         <p14:creationId xmlns:p14="http://schemas.microsoft.com/office/powerpoint/2010/main" val="3056046429"/>
+      </p:ext>
+    </p:extLst>
+  </p:cSld>
+  <p:clrMapOvr>
+    <a:masterClrMapping/>
+  </p:clrMapOvr>
+</p:sld>
+</file>
+
+<file path=ppt/slides/slide5.xml><?xml version="1.0" encoding="utf-8"?>
+<p:sld xmlns:a="http://schemas.openxmlformats.org/drawingml/2006/main" xmlns:r="http://schemas.openxmlformats.org/officeDocument/2006/relationships" xmlns:p="http://schemas.openxmlformats.org/presentationml/2006/main">
+  <p:cSld>
+    <p:spTree>
+      <p:nvGrpSpPr>
+        <p:cNvPr id="1" name=""/>
+        <p:cNvGrpSpPr/>
+        <p:nvPr/>
+      </p:nvGrpSpPr>
+      <p:grpSpPr>
+        <a:xfrm>
+          <a:off x="0" y="0"/>
+          <a:ext cx="0" cy="0"/>
+          <a:chOff x="0" y="0"/>
+          <a:chExt cx="0" cy="0"/>
+        </a:xfrm>
+      </p:grpSpPr>
+      <p:pic>
+        <p:nvPicPr>
+          <p:cNvPr id="4" name="Image 3">
+            <a:extLst>
+              <a:ext uri="{FF2B5EF4-FFF2-40B4-BE49-F238E27FC236}">
+                <a16:creationId xmlns:a16="http://schemas.microsoft.com/office/drawing/2014/main" id="{8D2025BF-9B4D-4720-8578-1AE767DBF39A}"/>
+              </a:ext>
+            </a:extLst>
+          </p:cNvPr>
+          <p:cNvPicPr>
+            <a:picLocks noChangeAspect="1"/>
+          </p:cNvPicPr>
+          <p:nvPr/>
+        </p:nvPicPr>
+        <p:blipFill>
+          <a:blip r:embed="rId2"/>
+          <a:stretch>
+            <a:fillRect/>
+          </a:stretch>
+        </p:blipFill>
+        <p:spPr>
+          <a:xfrm>
+            <a:off x="2573949" y="2553779"/>
+            <a:ext cx="667888" cy="630420"/>
+          </a:xfrm>
+          <a:prstGeom prst="rect">
+            <a:avLst/>
+          </a:prstGeom>
+          <a:effectLst>
+            <a:reflection blurRad="6350" stA="52000" endA="300" endPos="35000" dir="5400000" sy="-100000" algn="bl" rotWithShape="0"/>
+          </a:effectLst>
+        </p:spPr>
+      </p:pic>
+      <p:pic>
+        <p:nvPicPr>
+          <p:cNvPr id="5" name="Image 4">
+            <a:extLst>
+              <a:ext uri="{FF2B5EF4-FFF2-40B4-BE49-F238E27FC236}">
+                <a16:creationId xmlns:a16="http://schemas.microsoft.com/office/drawing/2014/main" id="{77743310-56F6-461D-80CB-F6071C359118}"/>
+              </a:ext>
+            </a:extLst>
+          </p:cNvPr>
+          <p:cNvPicPr>
+            <a:picLocks noChangeAspect="1"/>
+          </p:cNvPicPr>
+          <p:nvPr/>
+        </p:nvPicPr>
+        <p:blipFill>
+          <a:blip r:embed="rId3" cstate="hqprint">
+            <a:extLst>
+              <a:ext uri="{28A0092B-C50C-407E-A947-70E740481C1C}">
+                <a14:useLocalDpi xmlns:a14="http://schemas.microsoft.com/office/drawing/2010/main" val="0"/>
+              </a:ext>
+            </a:extLst>
+          </a:blip>
+          <a:stretch>
+            <a:fillRect/>
+          </a:stretch>
+        </p:blipFill>
+        <p:spPr>
+          <a:xfrm>
+            <a:off x="6316433" y="2561547"/>
+            <a:ext cx="734576" cy="577008"/>
+          </a:xfrm>
+          <a:prstGeom prst="rect">
+            <a:avLst/>
+          </a:prstGeom>
+        </p:spPr>
+      </p:pic>
+      <p:sp>
+        <p:nvSpPr>
+          <p:cNvPr id="7" name="ZoneTexte 6">
+            <a:extLst>
+              <a:ext uri="{FF2B5EF4-FFF2-40B4-BE49-F238E27FC236}">
+                <a16:creationId xmlns:a16="http://schemas.microsoft.com/office/drawing/2014/main" id="{96C1B7B7-C852-4155-B20A-F5102A212A56}"/>
+              </a:ext>
+            </a:extLst>
+          </p:cNvPr>
+          <p:cNvSpPr txBox="1"/>
+          <p:nvPr/>
+        </p:nvSpPr>
+        <p:spPr>
+          <a:xfrm>
+            <a:off x="9577252" y="4221332"/>
+            <a:ext cx="1062048" cy="938719"/>
+          </a:xfrm>
+          <a:prstGeom prst="rect">
+            <a:avLst/>
+          </a:prstGeom>
+          <a:noFill/>
+        </p:spPr>
+        <p:txBody>
+          <a:bodyPr wrap="square" rtlCol="0">
+            <a:spAutoFit/>
+          </a:bodyPr>
+          <a:lstStyle/>
+          <a:p>
+            <a:pPr>
+              <a:lnSpc>
+                <a:spcPts val="1200"/>
+              </a:lnSpc>
+              <a:spcAft>
+                <a:spcPts val="600"/>
+              </a:spcAft>
+            </a:pPr>
+            <a:endParaRPr lang="fr-FR" sz="2400" b="1" dirty="0" smtClean="0">
+              <a:solidFill>
+                <a:schemeClr val="tx1">
+                  <a:lumMod val="95000"/>
+                  <a:lumOff val="5000"/>
+                </a:schemeClr>
+              </a:solidFill>
+              <a:latin typeface="Verdana" panose="020B0604030504040204" pitchFamily="34" charset="0"/>
+              <a:ea typeface="Verdana" panose="020B0604030504040204" pitchFamily="34" charset="0"/>
+              <a:cs typeface="Arial" panose="020B0604020202020204" pitchFamily="34" charset="0"/>
+            </a:endParaRPr>
+          </a:p>
+          <a:p>
+            <a:pPr>
+              <a:lnSpc>
+                <a:spcPts val="1200"/>
+              </a:lnSpc>
+              <a:spcAft>
+                <a:spcPts val="600"/>
+              </a:spcAft>
+            </a:pPr>
+            <a:r>
+              <a:rPr lang="fr-FR" sz="1400" b="1" dirty="0" err="1" smtClean="0">
+                <a:solidFill>
+                  <a:schemeClr val="tx1">
+                    <a:lumMod val="95000"/>
+                    <a:lumOff val="5000"/>
+                  </a:schemeClr>
+                </a:solidFill>
+                <a:latin typeface="Verdana" panose="020B0604030504040204" pitchFamily="34" charset="0"/>
+                <a:ea typeface="Verdana" panose="020B0604030504040204" pitchFamily="34" charset="0"/>
+                <a:cs typeface="Arial" panose="020B0604020202020204" pitchFamily="34" charset="0"/>
+              </a:rPr>
+              <a:t>V</a:t>
+            </a:r>
+            <a:r>
+              <a:rPr lang="fr-FR" sz="1400" dirty="0" err="1" smtClean="0">
+                <a:solidFill>
+                  <a:schemeClr val="tx1">
+                    <a:lumMod val="65000"/>
+                    <a:lumOff val="35000"/>
+                  </a:schemeClr>
+                </a:solidFill>
+                <a:latin typeface="Verdana" panose="020B0604030504040204" pitchFamily="34" charset="0"/>
+                <a:ea typeface="Verdana" panose="020B0604030504040204" pitchFamily="34" charset="0"/>
+                <a:cs typeface="Arial" panose="020B0604020202020204" pitchFamily="34" charset="0"/>
+              </a:rPr>
+              <a:t>iewing</a:t>
+            </a:r>
+            <a:endParaRPr lang="fr-FR" sz="1600" dirty="0">
+              <a:solidFill>
+                <a:schemeClr val="tx1">
+                  <a:lumMod val="65000"/>
+                  <a:lumOff val="35000"/>
+                </a:schemeClr>
+              </a:solidFill>
+              <a:latin typeface="Verdana" panose="020B0604030504040204" pitchFamily="34" charset="0"/>
+              <a:ea typeface="Verdana" panose="020B0604030504040204" pitchFamily="34" charset="0"/>
+              <a:cs typeface="Arial" panose="020B0604020202020204" pitchFamily="34" charset="0"/>
+            </a:endParaRPr>
+          </a:p>
+          <a:p>
+            <a:pPr>
+              <a:lnSpc>
+                <a:spcPts val="1200"/>
+              </a:lnSpc>
+              <a:spcAft>
+                <a:spcPts val="600"/>
+              </a:spcAft>
+            </a:pPr>
+            <a:r>
+              <a:rPr lang="fr-FR" sz="1400" b="1" dirty="0" smtClean="0">
+                <a:solidFill>
+                  <a:schemeClr val="tx1">
+                    <a:lumMod val="95000"/>
+                    <a:lumOff val="5000"/>
+                  </a:schemeClr>
+                </a:solidFill>
+                <a:latin typeface="Verdana" panose="020B0604030504040204" pitchFamily="34" charset="0"/>
+                <a:ea typeface="Verdana" panose="020B0604030504040204" pitchFamily="34" charset="0"/>
+                <a:cs typeface="Arial" panose="020B0604020202020204" pitchFamily="34" charset="0"/>
+              </a:rPr>
+              <a:t>I</a:t>
+            </a:r>
+            <a:r>
+              <a:rPr lang="fr-FR" sz="1400" dirty="0" smtClean="0">
+                <a:solidFill>
+                  <a:schemeClr val="tx1">
+                    <a:lumMod val="65000"/>
+                    <a:lumOff val="35000"/>
+                  </a:schemeClr>
+                </a:solidFill>
+                <a:latin typeface="Verdana" panose="020B0604030504040204" pitchFamily="34" charset="0"/>
+                <a:ea typeface="Verdana" panose="020B0604030504040204" pitchFamily="34" charset="0"/>
+                <a:cs typeface="Arial" panose="020B0604020202020204" pitchFamily="34" charset="0"/>
+              </a:rPr>
+              <a:t>maging</a:t>
+            </a:r>
+            <a:endParaRPr lang="fr-FR" sz="1600" dirty="0" smtClean="0">
+              <a:solidFill>
+                <a:schemeClr val="tx1">
+                  <a:lumMod val="65000"/>
+                  <a:lumOff val="35000"/>
+                </a:schemeClr>
+              </a:solidFill>
+              <a:latin typeface="Verdana" panose="020B0604030504040204" pitchFamily="34" charset="0"/>
+              <a:ea typeface="Verdana" panose="020B0604030504040204" pitchFamily="34" charset="0"/>
+              <a:cs typeface="Arial" panose="020B0604020202020204" pitchFamily="34" charset="0"/>
+            </a:endParaRPr>
+          </a:p>
+          <a:p>
+            <a:pPr>
+              <a:lnSpc>
+                <a:spcPts val="1200"/>
+              </a:lnSpc>
+              <a:spcAft>
+                <a:spcPts val="600"/>
+              </a:spcAft>
+            </a:pPr>
+            <a:r>
+              <a:rPr lang="fr-FR" sz="1400" b="1" dirty="0" smtClean="0">
+                <a:solidFill>
+                  <a:schemeClr val="tx1">
+                    <a:lumMod val="95000"/>
+                    <a:lumOff val="5000"/>
+                  </a:schemeClr>
+                </a:solidFill>
+                <a:latin typeface="Verdana" panose="020B0604030504040204" pitchFamily="34" charset="0"/>
+                <a:ea typeface="Verdana" panose="020B0604030504040204" pitchFamily="34" charset="0"/>
+                <a:cs typeface="Arial" panose="020B0604020202020204" pitchFamily="34" charset="0"/>
+              </a:rPr>
+              <a:t>P</a:t>
+            </a:r>
+            <a:r>
+              <a:rPr lang="fr-FR" sz="1400" dirty="0" smtClean="0">
+                <a:solidFill>
+                  <a:schemeClr val="tx1">
+                    <a:lumMod val="65000"/>
+                    <a:lumOff val="35000"/>
+                  </a:schemeClr>
+                </a:solidFill>
+                <a:latin typeface="Verdana" panose="020B0604030504040204" pitchFamily="34" charset="0"/>
+                <a:ea typeface="Verdana" panose="020B0604030504040204" pitchFamily="34" charset="0"/>
+                <a:cs typeface="Arial" panose="020B0604020202020204" pitchFamily="34" charset="0"/>
+              </a:rPr>
+              <a:t>latform</a:t>
+            </a:r>
+            <a:endParaRPr lang="fr-FR" sz="1600" dirty="0">
+              <a:solidFill>
+                <a:schemeClr val="tx1">
+                  <a:lumMod val="65000"/>
+                  <a:lumOff val="35000"/>
+                </a:schemeClr>
+              </a:solidFill>
+              <a:latin typeface="Verdana" panose="020B0604030504040204" pitchFamily="34" charset="0"/>
+              <a:ea typeface="Verdana" panose="020B0604030504040204" pitchFamily="34" charset="0"/>
+              <a:cs typeface="Arial" panose="020B0604020202020204" pitchFamily="34" charset="0"/>
+            </a:endParaRPr>
+          </a:p>
+        </p:txBody>
+      </p:sp>
+      <p:sp>
+        <p:nvSpPr>
+          <p:cNvPr id="8" name="ZoneTexte 7">
+            <a:extLst>
+              <a:ext uri="{FF2B5EF4-FFF2-40B4-BE49-F238E27FC236}">
+                <a16:creationId xmlns:a16="http://schemas.microsoft.com/office/drawing/2014/main" id="{1DD6F4B8-9F34-4C2C-B716-EB10F72BD339}"/>
+              </a:ext>
+            </a:extLst>
+          </p:cNvPr>
+          <p:cNvSpPr txBox="1"/>
+          <p:nvPr/>
+        </p:nvSpPr>
+        <p:spPr>
+          <a:xfrm>
+            <a:off x="3403045" y="2553779"/>
+            <a:ext cx="2971577" cy="584775"/>
+          </a:xfrm>
+          <a:prstGeom prst="rect">
+            <a:avLst/>
+          </a:prstGeom>
+          <a:noFill/>
+        </p:spPr>
+        <p:txBody>
+          <a:bodyPr wrap="square" rtlCol="0">
+            <a:spAutoFit/>
+          </a:bodyPr>
+          <a:lstStyle/>
+          <a:p>
+            <a:r>
+              <a:rPr lang="fr-FR" sz="3200" kern="1500" spc="100" dirty="0" smtClean="0">
+                <a:solidFill>
+                  <a:schemeClr val="tx1">
+                    <a:lumMod val="95000"/>
+                    <a:lumOff val="5000"/>
+                  </a:schemeClr>
+                </a:solidFill>
+                <a:latin typeface="Verdana" panose="020B0604030504040204" pitchFamily="34" charset="0"/>
+                <a:ea typeface="Verdana" panose="020B0604030504040204" pitchFamily="34" charset="0"/>
+                <a:cs typeface="Calibri" panose="020F0502020204030204" pitchFamily="34" charset="0"/>
+              </a:rPr>
+              <a:t>THERMAVIP </a:t>
+            </a:r>
+            <a:endParaRPr lang="fr-FR" sz="3200" kern="1500" spc="100" dirty="0">
+              <a:solidFill>
+                <a:schemeClr val="tx1">
+                  <a:lumMod val="95000"/>
+                  <a:lumOff val="5000"/>
+                </a:schemeClr>
+              </a:solidFill>
+              <a:latin typeface="Verdana" panose="020B0604030504040204" pitchFamily="34" charset="0"/>
+              <a:ea typeface="Verdana" panose="020B0604030504040204" pitchFamily="34" charset="0"/>
+              <a:cs typeface="Calibri" panose="020F0502020204030204" pitchFamily="34" charset="0"/>
+            </a:endParaRPr>
+          </a:p>
+        </p:txBody>
+      </p:sp>
+      <p:sp>
+        <p:nvSpPr>
+          <p:cNvPr id="9" name="Rectangle : avec coin rogné 3">
+            <a:extLst>
+              <a:ext uri="{FF2B5EF4-FFF2-40B4-BE49-F238E27FC236}">
+                <a16:creationId xmlns:a16="http://schemas.microsoft.com/office/drawing/2014/main" id="{4235E02F-EA39-4F44-BE72-4CD0A741EA64}"/>
+              </a:ext>
+            </a:extLst>
+          </p:cNvPr>
+          <p:cNvSpPr/>
+          <p:nvPr/>
+        </p:nvSpPr>
+        <p:spPr>
+          <a:xfrm>
+            <a:off x="2804168" y="4126438"/>
+            <a:ext cx="2824328" cy="545315"/>
+          </a:xfrm>
+          <a:prstGeom prst="snip1Rect">
+            <a:avLst>
+              <a:gd name="adj" fmla="val 5556"/>
+            </a:avLst>
+          </a:prstGeom>
+          <a:solidFill>
+            <a:srgbClr val="2D2D30"/>
+          </a:solidFill>
+          <a:ln>
+            <a:noFill/>
+          </a:ln>
+        </p:spPr>
+        <p:style>
+          <a:lnRef idx="2">
+            <a:schemeClr val="accent1">
+              <a:shade val="50000"/>
+            </a:schemeClr>
+          </a:lnRef>
+          <a:fillRef idx="1">
+            <a:schemeClr val="accent1"/>
+          </a:fillRef>
+          <a:effectRef idx="0">
+            <a:schemeClr val="accent1"/>
+          </a:effectRef>
+          <a:fontRef idx="minor">
+            <a:schemeClr val="lt1"/>
+          </a:fontRef>
+        </p:style>
+        <p:txBody>
+          <a:bodyPr rtlCol="0" anchor="ctr"/>
+          <a:lstStyle/>
+          <a:p>
+            <a:pPr algn="ctr"/>
+            <a:endParaRPr lang="fr-FR"/>
+          </a:p>
+        </p:txBody>
+      </p:sp>
+      <p:sp>
+        <p:nvSpPr>
+          <p:cNvPr id="10" name="ZoneTexte 9">
+            <a:extLst>
+              <a:ext uri="{FF2B5EF4-FFF2-40B4-BE49-F238E27FC236}">
+                <a16:creationId xmlns:a16="http://schemas.microsoft.com/office/drawing/2014/main" id="{1DD6F4B8-9F34-4C2C-B716-EB10F72BD339}"/>
+              </a:ext>
+            </a:extLst>
+          </p:cNvPr>
+          <p:cNvSpPr txBox="1"/>
+          <p:nvPr/>
+        </p:nvSpPr>
+        <p:spPr>
+          <a:xfrm>
+            <a:off x="3321653" y="4185451"/>
+            <a:ext cx="1272579" cy="369332"/>
+          </a:xfrm>
+          <a:prstGeom prst="rect">
+            <a:avLst/>
+          </a:prstGeom>
+          <a:noFill/>
+        </p:spPr>
+        <p:txBody>
+          <a:bodyPr wrap="square" rtlCol="0">
+            <a:spAutoFit/>
+          </a:bodyPr>
+          <a:lstStyle/>
+          <a:p>
+            <a:r>
+              <a:rPr lang="fr-FR" b="1" dirty="0" err="1">
+                <a:solidFill>
+                  <a:schemeClr val="bg1"/>
+                </a:solidFill>
+                <a:latin typeface="+mj-lt"/>
+                <a:cs typeface="Arial" panose="020B0604020202020204" pitchFamily="34" charset="0"/>
+              </a:rPr>
+              <a:t>ThermaVIP</a:t>
+            </a:r>
+            <a:r>
+              <a:rPr lang="fr-FR" b="1" dirty="0">
+                <a:solidFill>
+                  <a:schemeClr val="bg1"/>
+                </a:solidFill>
+                <a:latin typeface="+mj-lt"/>
+                <a:cs typeface="Arial" panose="020B0604020202020204" pitchFamily="34" charset="0"/>
+              </a:rPr>
+              <a:t> </a:t>
+            </a:r>
+          </a:p>
+        </p:txBody>
+      </p:sp>
+      <p:sp>
+        <p:nvSpPr>
+          <p:cNvPr id="13" name="Triangle rectangle 12">
+            <a:extLst>
+              <a:ext uri="{FF2B5EF4-FFF2-40B4-BE49-F238E27FC236}">
+                <a16:creationId xmlns:a16="http://schemas.microsoft.com/office/drawing/2014/main" id="{0336BF78-C525-4143-87D2-2A722A01C007}"/>
+              </a:ext>
+            </a:extLst>
+          </p:cNvPr>
+          <p:cNvSpPr/>
+          <p:nvPr/>
+        </p:nvSpPr>
+        <p:spPr>
+          <a:xfrm>
+            <a:off x="5533929" y="4127379"/>
+            <a:ext cx="95136" cy="93927"/>
+          </a:xfrm>
+          <a:prstGeom prst="rtTriangle">
+            <a:avLst/>
+          </a:prstGeom>
+          <a:solidFill>
+            <a:schemeClr val="tx1">
+              <a:lumMod val="65000"/>
+              <a:lumOff val="35000"/>
+            </a:schemeClr>
+          </a:solidFill>
+          <a:ln>
+            <a:noFill/>
+          </a:ln>
+        </p:spPr>
+        <p:style>
+          <a:lnRef idx="2">
+            <a:schemeClr val="accent1">
+              <a:shade val="50000"/>
+            </a:schemeClr>
+          </a:lnRef>
+          <a:fillRef idx="1">
+            <a:schemeClr val="accent1"/>
+          </a:fillRef>
+          <a:effectRef idx="0">
+            <a:schemeClr val="accent1"/>
+          </a:effectRef>
+          <a:fontRef idx="minor">
+            <a:schemeClr val="lt1"/>
+          </a:fontRef>
+        </p:style>
+        <p:txBody>
+          <a:bodyPr rtlCol="0" anchor="ctr"/>
+          <a:lstStyle/>
+          <a:p>
+            <a:pPr algn="ctr"/>
+            <a:endParaRPr lang="fr-FR" dirty="0"/>
+          </a:p>
+        </p:txBody>
+      </p:sp>
+      <p:pic>
+        <p:nvPicPr>
+          <p:cNvPr id="15" name="Image 14"/>
+          <p:cNvPicPr>
+            <a:picLocks noChangeAspect="1"/>
+          </p:cNvPicPr>
+          <p:nvPr/>
+        </p:nvPicPr>
+        <p:blipFill>
+          <a:blip r:embed="rId4">
+            <a:extLst>
+              <a:ext uri="{28A0092B-C50C-407E-A947-70E740481C1C}">
+                <a14:useLocalDpi xmlns:a14="http://schemas.microsoft.com/office/drawing/2010/main" val="0"/>
+              </a:ext>
+            </a:extLst>
+          </a:blip>
+          <a:stretch>
+            <a:fillRect/>
+          </a:stretch>
+        </p:blipFill>
+        <p:spPr>
+          <a:xfrm>
+            <a:off x="4587970" y="4248398"/>
+            <a:ext cx="357112" cy="289032"/>
+          </a:xfrm>
+          <a:prstGeom prst="rect">
+            <a:avLst/>
+          </a:prstGeom>
+        </p:spPr>
+      </p:pic>
+      <p:pic>
+        <p:nvPicPr>
+          <p:cNvPr id="16" name="Image 15"/>
+          <p:cNvPicPr>
+            <a:picLocks noChangeAspect="1"/>
+          </p:cNvPicPr>
+          <p:nvPr/>
+        </p:nvPicPr>
+        <p:blipFill>
+          <a:blip r:embed="rId5">
+            <a:extLst>
+              <a:ext uri="{28A0092B-C50C-407E-A947-70E740481C1C}">
+                <a14:useLocalDpi xmlns:a14="http://schemas.microsoft.com/office/drawing/2010/main" val="0"/>
+              </a:ext>
+            </a:extLst>
+          </a:blip>
+          <a:stretch>
+            <a:fillRect/>
+          </a:stretch>
+        </p:blipFill>
+        <p:spPr>
+          <a:xfrm>
+            <a:off x="5024135" y="4258305"/>
+            <a:ext cx="403097" cy="250233"/>
+          </a:xfrm>
+          <a:prstGeom prst="rect">
+            <a:avLst/>
+          </a:prstGeom>
+        </p:spPr>
+      </p:pic>
+      <p:pic>
+        <p:nvPicPr>
+          <p:cNvPr id="17" name="Image 16"/>
+          <p:cNvPicPr>
+            <a:picLocks noChangeAspect="1"/>
+          </p:cNvPicPr>
+          <p:nvPr/>
+        </p:nvPicPr>
+        <p:blipFill>
+          <a:blip r:embed="rId6">
+            <a:extLst>
+              <a:ext uri="{28A0092B-C50C-407E-A947-70E740481C1C}">
+                <a14:useLocalDpi xmlns:a14="http://schemas.microsoft.com/office/drawing/2010/main" val="0"/>
+              </a:ext>
+            </a:extLst>
+          </a:blip>
+          <a:stretch>
+            <a:fillRect/>
+          </a:stretch>
+        </p:blipFill>
+        <p:spPr>
+          <a:xfrm>
+            <a:off x="2857677" y="4217336"/>
+            <a:ext cx="384160" cy="364758"/>
+          </a:xfrm>
+          <a:prstGeom prst="rect">
+            <a:avLst/>
+          </a:prstGeom>
+        </p:spPr>
+      </p:pic>
+    </p:spTree>
+    <p:extLst>
+      <p:ext uri="{BB962C8B-B14F-4D97-AF65-F5344CB8AC3E}">
+        <p14:creationId xmlns:p14="http://schemas.microsoft.com/office/powerpoint/2010/main" val="4004750887"/>
       </p:ext>
     </p:extLst>
   </p:cSld>

</xml_diff>

<commit_message>
(Annotation) Added error message support to shapeFromJson() (Core) Reduced CPU footprint of IDLE processing (Core) VipAffineTransform now works on RGB images (DataType) Added VipSIMD.h/cpp: check supported simd extensions (DataType) Added VipHash.h/cpp: komihash hashing function (GUI) Optimized VipMapFileSystem to reduce its CPU footprint (GUI) Optimized VipTimeRangeItem drawing (GUI) Corrected drag&drop of XML/JSON ROI files on video players (Plotting) Optimized computation of color scale with flatten histogram (FFmpeg) Added support for multithreaded recording of h264 videos
</commit_message>
<xml_diff>
--- a/icons/splashscreens.pptx
+++ b/icons/splashscreens.pptx
@@ -267,7 +267,7 @@
           <a:p>
             <a:fld id="{D95F3F3F-3E05-4475-BDF7-9F1F10448BC5}" type="datetimeFigureOut">
               <a:rPr lang="fr-FR" smtClean="0"/>
-              <a:t>19/10/2023</a:t>
+              <a:t>29/01/2024</a:t>
             </a:fld>
             <a:endParaRPr lang="fr-FR"/>
           </a:p>
@@ -465,7 +465,7 @@
           <a:p>
             <a:fld id="{D95F3F3F-3E05-4475-BDF7-9F1F10448BC5}" type="datetimeFigureOut">
               <a:rPr lang="fr-FR" smtClean="0"/>
-              <a:t>19/10/2023</a:t>
+              <a:t>29/01/2024</a:t>
             </a:fld>
             <a:endParaRPr lang="fr-FR"/>
           </a:p>
@@ -673,7 +673,7 @@
           <a:p>
             <a:fld id="{D95F3F3F-3E05-4475-BDF7-9F1F10448BC5}" type="datetimeFigureOut">
               <a:rPr lang="fr-FR" smtClean="0"/>
-              <a:t>19/10/2023</a:t>
+              <a:t>29/01/2024</a:t>
             </a:fld>
             <a:endParaRPr lang="fr-FR"/>
           </a:p>
@@ -871,7 +871,7 @@
           <a:p>
             <a:fld id="{D95F3F3F-3E05-4475-BDF7-9F1F10448BC5}" type="datetimeFigureOut">
               <a:rPr lang="fr-FR" smtClean="0"/>
-              <a:t>19/10/2023</a:t>
+              <a:t>29/01/2024</a:t>
             </a:fld>
             <a:endParaRPr lang="fr-FR"/>
           </a:p>
@@ -1146,7 +1146,7 @@
           <a:p>
             <a:fld id="{D95F3F3F-3E05-4475-BDF7-9F1F10448BC5}" type="datetimeFigureOut">
               <a:rPr lang="fr-FR" smtClean="0"/>
-              <a:t>19/10/2023</a:t>
+              <a:t>29/01/2024</a:t>
             </a:fld>
             <a:endParaRPr lang="fr-FR"/>
           </a:p>
@@ -1411,7 +1411,7 @@
           <a:p>
             <a:fld id="{D95F3F3F-3E05-4475-BDF7-9F1F10448BC5}" type="datetimeFigureOut">
               <a:rPr lang="fr-FR" smtClean="0"/>
-              <a:t>19/10/2023</a:t>
+              <a:t>29/01/2024</a:t>
             </a:fld>
             <a:endParaRPr lang="fr-FR"/>
           </a:p>
@@ -1823,7 +1823,7 @@
           <a:p>
             <a:fld id="{D95F3F3F-3E05-4475-BDF7-9F1F10448BC5}" type="datetimeFigureOut">
               <a:rPr lang="fr-FR" smtClean="0"/>
-              <a:t>19/10/2023</a:t>
+              <a:t>29/01/2024</a:t>
             </a:fld>
             <a:endParaRPr lang="fr-FR"/>
           </a:p>
@@ -1964,7 +1964,7 @@
           <a:p>
             <a:fld id="{D95F3F3F-3E05-4475-BDF7-9F1F10448BC5}" type="datetimeFigureOut">
               <a:rPr lang="fr-FR" smtClean="0"/>
-              <a:t>19/10/2023</a:t>
+              <a:t>29/01/2024</a:t>
             </a:fld>
             <a:endParaRPr lang="fr-FR"/>
           </a:p>
@@ -2077,7 +2077,7 @@
           <a:p>
             <a:fld id="{D95F3F3F-3E05-4475-BDF7-9F1F10448BC5}" type="datetimeFigureOut">
               <a:rPr lang="fr-FR" smtClean="0"/>
-              <a:t>19/10/2023</a:t>
+              <a:t>29/01/2024</a:t>
             </a:fld>
             <a:endParaRPr lang="fr-FR"/>
           </a:p>
@@ -2388,7 +2388,7 @@
           <a:p>
             <a:fld id="{D95F3F3F-3E05-4475-BDF7-9F1F10448BC5}" type="datetimeFigureOut">
               <a:rPr lang="fr-FR" smtClean="0"/>
-              <a:t>19/10/2023</a:t>
+              <a:t>29/01/2024</a:t>
             </a:fld>
             <a:endParaRPr lang="fr-FR"/>
           </a:p>
@@ -2676,7 +2676,7 @@
           <a:p>
             <a:fld id="{D95F3F3F-3E05-4475-BDF7-9F1F10448BC5}" type="datetimeFigureOut">
               <a:rPr lang="fr-FR" smtClean="0"/>
-              <a:t>19/10/2023</a:t>
+              <a:t>29/01/2024</a:t>
             </a:fld>
             <a:endParaRPr lang="fr-FR"/>
           </a:p>
@@ -2917,7 +2917,7 @@
           <a:p>
             <a:fld id="{D95F3F3F-3E05-4475-BDF7-9F1F10448BC5}" type="datetimeFigureOut">
               <a:rPr lang="fr-FR" smtClean="0"/>
-              <a:t>19/10/2023</a:t>
+              <a:t>29/01/2024</a:t>
             </a:fld>
             <a:endParaRPr lang="fr-FR"/>
           </a:p>
@@ -4855,7 +4855,17 @@
                 <a:latin typeface="+mj-lt"/>
                 <a:cs typeface="Arial" panose="020B0604020202020204" pitchFamily="34" charset="0"/>
               </a:rPr>
-              <a:t> 2023</a:t>
+              <a:t> </a:t>
+            </a:r>
+            <a:r>
+              <a:rPr lang="fr-FR" sz="1050" dirty="0" smtClean="0">
+                <a:solidFill>
+                  <a:schemeClr val="bg1"/>
+                </a:solidFill>
+                <a:latin typeface="+mj-lt"/>
+                <a:cs typeface="Arial" panose="020B0604020202020204" pitchFamily="34" charset="0"/>
+              </a:rPr>
+              <a:t>2024</a:t>
             </a:r>
             <a:endParaRPr lang="fr-FR" sz="1050" dirty="0">
               <a:solidFill>

</xml_diff>

<commit_message>
overall refactoring. updated opengl thread rendering mode.
</commit_message>
<xml_diff>
--- a/icons/splashscreens.pptx
+++ b/icons/splashscreens.pptx
@@ -267,7 +267,7 @@
           <a:p>
             <a:fld id="{D95F3F3F-3E05-4475-BDF7-9F1F10448BC5}" type="datetimeFigureOut">
               <a:rPr lang="fr-FR" smtClean="0"/>
-              <a:t>29/01/2024</a:t>
+              <a:t>15/01/2025</a:t>
             </a:fld>
             <a:endParaRPr lang="fr-FR"/>
           </a:p>
@@ -465,7 +465,7 @@
           <a:p>
             <a:fld id="{D95F3F3F-3E05-4475-BDF7-9F1F10448BC5}" type="datetimeFigureOut">
               <a:rPr lang="fr-FR" smtClean="0"/>
-              <a:t>29/01/2024</a:t>
+              <a:t>15/01/2025</a:t>
             </a:fld>
             <a:endParaRPr lang="fr-FR"/>
           </a:p>
@@ -673,7 +673,7 @@
           <a:p>
             <a:fld id="{D95F3F3F-3E05-4475-BDF7-9F1F10448BC5}" type="datetimeFigureOut">
               <a:rPr lang="fr-FR" smtClean="0"/>
-              <a:t>29/01/2024</a:t>
+              <a:t>15/01/2025</a:t>
             </a:fld>
             <a:endParaRPr lang="fr-FR"/>
           </a:p>
@@ -871,7 +871,7 @@
           <a:p>
             <a:fld id="{D95F3F3F-3E05-4475-BDF7-9F1F10448BC5}" type="datetimeFigureOut">
               <a:rPr lang="fr-FR" smtClean="0"/>
-              <a:t>29/01/2024</a:t>
+              <a:t>15/01/2025</a:t>
             </a:fld>
             <a:endParaRPr lang="fr-FR"/>
           </a:p>
@@ -1146,7 +1146,7 @@
           <a:p>
             <a:fld id="{D95F3F3F-3E05-4475-BDF7-9F1F10448BC5}" type="datetimeFigureOut">
               <a:rPr lang="fr-FR" smtClean="0"/>
-              <a:t>29/01/2024</a:t>
+              <a:t>15/01/2025</a:t>
             </a:fld>
             <a:endParaRPr lang="fr-FR"/>
           </a:p>
@@ -1411,7 +1411,7 @@
           <a:p>
             <a:fld id="{D95F3F3F-3E05-4475-BDF7-9F1F10448BC5}" type="datetimeFigureOut">
               <a:rPr lang="fr-FR" smtClean="0"/>
-              <a:t>29/01/2024</a:t>
+              <a:t>15/01/2025</a:t>
             </a:fld>
             <a:endParaRPr lang="fr-FR"/>
           </a:p>
@@ -1823,7 +1823,7 @@
           <a:p>
             <a:fld id="{D95F3F3F-3E05-4475-BDF7-9F1F10448BC5}" type="datetimeFigureOut">
               <a:rPr lang="fr-FR" smtClean="0"/>
-              <a:t>29/01/2024</a:t>
+              <a:t>15/01/2025</a:t>
             </a:fld>
             <a:endParaRPr lang="fr-FR"/>
           </a:p>
@@ -1964,7 +1964,7 @@
           <a:p>
             <a:fld id="{D95F3F3F-3E05-4475-BDF7-9F1F10448BC5}" type="datetimeFigureOut">
               <a:rPr lang="fr-FR" smtClean="0"/>
-              <a:t>29/01/2024</a:t>
+              <a:t>15/01/2025</a:t>
             </a:fld>
             <a:endParaRPr lang="fr-FR"/>
           </a:p>
@@ -2077,7 +2077,7 @@
           <a:p>
             <a:fld id="{D95F3F3F-3E05-4475-BDF7-9F1F10448BC5}" type="datetimeFigureOut">
               <a:rPr lang="fr-FR" smtClean="0"/>
-              <a:t>29/01/2024</a:t>
+              <a:t>15/01/2025</a:t>
             </a:fld>
             <a:endParaRPr lang="fr-FR"/>
           </a:p>
@@ -2388,7 +2388,7 @@
           <a:p>
             <a:fld id="{D95F3F3F-3E05-4475-BDF7-9F1F10448BC5}" type="datetimeFigureOut">
               <a:rPr lang="fr-FR" smtClean="0"/>
-              <a:t>29/01/2024</a:t>
+              <a:t>15/01/2025</a:t>
             </a:fld>
             <a:endParaRPr lang="fr-FR"/>
           </a:p>
@@ -2676,7 +2676,7 @@
           <a:p>
             <a:fld id="{D95F3F3F-3E05-4475-BDF7-9F1F10448BC5}" type="datetimeFigureOut">
               <a:rPr lang="fr-FR" smtClean="0"/>
-              <a:t>29/01/2024</a:t>
+              <a:t>15/01/2025</a:t>
             </a:fld>
             <a:endParaRPr lang="fr-FR"/>
           </a:p>
@@ -2917,7 +2917,7 @@
           <a:p>
             <a:fld id="{D95F3F3F-3E05-4475-BDF7-9F1F10448BC5}" type="datetimeFigureOut">
               <a:rPr lang="fr-FR" smtClean="0"/>
-              <a:t>29/01/2024</a:t>
+              <a:t>15/01/2025</a:t>
             </a:fld>
             <a:endParaRPr lang="fr-FR"/>
           </a:p>
@@ -4865,7 +4865,7 @@
                 <a:latin typeface="+mj-lt"/>
                 <a:cs typeface="Arial" panose="020B0604020202020204" pitchFamily="34" charset="0"/>
               </a:rPr>
-              <a:t>2024</a:t>
+              <a:t>2025</a:t>
             </a:r>
             <a:endParaRPr lang="fr-FR" sz="1050" dirty="0">
               <a:solidFill>

</xml_diff>

<commit_message>
several API corrections/changes. Added H5 support to VipCore with new VipH5Archive. Several updates/corrections based on feedback on V5.0.0.
</commit_message>
<xml_diff>
--- a/icons/splashscreens.pptx
+++ b/icons/splashscreens.pptx
@@ -267,7 +267,7 @@
           <a:p>
             <a:fld id="{D95F3F3F-3E05-4475-BDF7-9F1F10448BC5}" type="datetimeFigureOut">
               <a:rPr lang="fr-FR" smtClean="0"/>
-              <a:t>15/01/2025</a:t>
+              <a:t>21/01/2025</a:t>
             </a:fld>
             <a:endParaRPr lang="fr-FR"/>
           </a:p>
@@ -465,7 +465,7 @@
           <a:p>
             <a:fld id="{D95F3F3F-3E05-4475-BDF7-9F1F10448BC5}" type="datetimeFigureOut">
               <a:rPr lang="fr-FR" smtClean="0"/>
-              <a:t>15/01/2025</a:t>
+              <a:t>21/01/2025</a:t>
             </a:fld>
             <a:endParaRPr lang="fr-FR"/>
           </a:p>
@@ -673,7 +673,7 @@
           <a:p>
             <a:fld id="{D95F3F3F-3E05-4475-BDF7-9F1F10448BC5}" type="datetimeFigureOut">
               <a:rPr lang="fr-FR" smtClean="0"/>
-              <a:t>15/01/2025</a:t>
+              <a:t>21/01/2025</a:t>
             </a:fld>
             <a:endParaRPr lang="fr-FR"/>
           </a:p>
@@ -871,7 +871,7 @@
           <a:p>
             <a:fld id="{D95F3F3F-3E05-4475-BDF7-9F1F10448BC5}" type="datetimeFigureOut">
               <a:rPr lang="fr-FR" smtClean="0"/>
-              <a:t>15/01/2025</a:t>
+              <a:t>21/01/2025</a:t>
             </a:fld>
             <a:endParaRPr lang="fr-FR"/>
           </a:p>
@@ -1146,7 +1146,7 @@
           <a:p>
             <a:fld id="{D95F3F3F-3E05-4475-BDF7-9F1F10448BC5}" type="datetimeFigureOut">
               <a:rPr lang="fr-FR" smtClean="0"/>
-              <a:t>15/01/2025</a:t>
+              <a:t>21/01/2025</a:t>
             </a:fld>
             <a:endParaRPr lang="fr-FR"/>
           </a:p>
@@ -1411,7 +1411,7 @@
           <a:p>
             <a:fld id="{D95F3F3F-3E05-4475-BDF7-9F1F10448BC5}" type="datetimeFigureOut">
               <a:rPr lang="fr-FR" smtClean="0"/>
-              <a:t>15/01/2025</a:t>
+              <a:t>21/01/2025</a:t>
             </a:fld>
             <a:endParaRPr lang="fr-FR"/>
           </a:p>
@@ -1823,7 +1823,7 @@
           <a:p>
             <a:fld id="{D95F3F3F-3E05-4475-BDF7-9F1F10448BC5}" type="datetimeFigureOut">
               <a:rPr lang="fr-FR" smtClean="0"/>
-              <a:t>15/01/2025</a:t>
+              <a:t>21/01/2025</a:t>
             </a:fld>
             <a:endParaRPr lang="fr-FR"/>
           </a:p>
@@ -1964,7 +1964,7 @@
           <a:p>
             <a:fld id="{D95F3F3F-3E05-4475-BDF7-9F1F10448BC5}" type="datetimeFigureOut">
               <a:rPr lang="fr-FR" smtClean="0"/>
-              <a:t>15/01/2025</a:t>
+              <a:t>21/01/2025</a:t>
             </a:fld>
             <a:endParaRPr lang="fr-FR"/>
           </a:p>
@@ -2077,7 +2077,7 @@
           <a:p>
             <a:fld id="{D95F3F3F-3E05-4475-BDF7-9F1F10448BC5}" type="datetimeFigureOut">
               <a:rPr lang="fr-FR" smtClean="0"/>
-              <a:t>15/01/2025</a:t>
+              <a:t>21/01/2025</a:t>
             </a:fld>
             <a:endParaRPr lang="fr-FR"/>
           </a:p>
@@ -2388,7 +2388,7 @@
           <a:p>
             <a:fld id="{D95F3F3F-3E05-4475-BDF7-9F1F10448BC5}" type="datetimeFigureOut">
               <a:rPr lang="fr-FR" smtClean="0"/>
-              <a:t>15/01/2025</a:t>
+              <a:t>21/01/2025</a:t>
             </a:fld>
             <a:endParaRPr lang="fr-FR"/>
           </a:p>
@@ -2676,7 +2676,7 @@
           <a:p>
             <a:fld id="{D95F3F3F-3E05-4475-BDF7-9F1F10448BC5}" type="datetimeFigureOut">
               <a:rPr lang="fr-FR" smtClean="0"/>
-              <a:t>15/01/2025</a:t>
+              <a:t>21/01/2025</a:t>
             </a:fld>
             <a:endParaRPr lang="fr-FR"/>
           </a:p>
@@ -2917,7 +2917,7 @@
           <a:p>
             <a:fld id="{D95F3F3F-3E05-4475-BDF7-9F1F10448BC5}" type="datetimeFigureOut">
               <a:rPr lang="fr-FR" smtClean="0"/>
-              <a:t>15/01/2025</a:t>
+              <a:t>21/01/2025</a:t>
             </a:fld>
             <a:endParaRPr lang="fr-FR"/>
           </a:p>
@@ -4855,17 +4855,7 @@
                 <a:latin typeface="+mj-lt"/>
                 <a:cs typeface="Arial" panose="020B0604020202020204" pitchFamily="34" charset="0"/>
               </a:rPr>
-              <a:t> </a:t>
-            </a:r>
-            <a:r>
-              <a:rPr lang="fr-FR" sz="1050" dirty="0" smtClean="0">
-                <a:solidFill>
-                  <a:schemeClr val="bg1"/>
-                </a:solidFill>
-                <a:latin typeface="+mj-lt"/>
-                <a:cs typeface="Arial" panose="020B0604020202020204" pitchFamily="34" charset="0"/>
-              </a:rPr>
-              <a:t>2025</a:t>
+              <a:t> 2025</a:t>
             </a:r>
             <a:endParaRPr lang="fr-FR" sz="1050" dirty="0">
               <a:solidFill>
@@ -5271,7 +5261,7 @@
         </p:blipFill>
         <p:spPr>
           <a:xfrm>
-            <a:off x="4881548" y="2964706"/>
+            <a:off x="4848296" y="2964706"/>
             <a:ext cx="494322" cy="388289"/>
           </a:xfrm>
           <a:prstGeom prst="rect">

</xml_diff>

<commit_message>
tested switch arch format to H5
</commit_message>
<xml_diff>
--- a/icons/splashscreens.pptx
+++ b/icons/splashscreens.pptx
@@ -267,7 +267,7 @@
           <a:p>
             <a:fld id="{D95F3F3F-3E05-4475-BDF7-9F1F10448BC5}" type="datetimeFigureOut">
               <a:rPr lang="fr-FR" smtClean="0"/>
-              <a:t>21/01/2025</a:t>
+              <a:t>24/01/2025</a:t>
             </a:fld>
             <a:endParaRPr lang="fr-FR"/>
           </a:p>
@@ -465,7 +465,7 @@
           <a:p>
             <a:fld id="{D95F3F3F-3E05-4475-BDF7-9F1F10448BC5}" type="datetimeFigureOut">
               <a:rPr lang="fr-FR" smtClean="0"/>
-              <a:t>21/01/2025</a:t>
+              <a:t>24/01/2025</a:t>
             </a:fld>
             <a:endParaRPr lang="fr-FR"/>
           </a:p>
@@ -673,7 +673,7 @@
           <a:p>
             <a:fld id="{D95F3F3F-3E05-4475-BDF7-9F1F10448BC5}" type="datetimeFigureOut">
               <a:rPr lang="fr-FR" smtClean="0"/>
-              <a:t>21/01/2025</a:t>
+              <a:t>24/01/2025</a:t>
             </a:fld>
             <a:endParaRPr lang="fr-FR"/>
           </a:p>
@@ -871,7 +871,7 @@
           <a:p>
             <a:fld id="{D95F3F3F-3E05-4475-BDF7-9F1F10448BC5}" type="datetimeFigureOut">
               <a:rPr lang="fr-FR" smtClean="0"/>
-              <a:t>21/01/2025</a:t>
+              <a:t>24/01/2025</a:t>
             </a:fld>
             <a:endParaRPr lang="fr-FR"/>
           </a:p>
@@ -1146,7 +1146,7 @@
           <a:p>
             <a:fld id="{D95F3F3F-3E05-4475-BDF7-9F1F10448BC5}" type="datetimeFigureOut">
               <a:rPr lang="fr-FR" smtClean="0"/>
-              <a:t>21/01/2025</a:t>
+              <a:t>24/01/2025</a:t>
             </a:fld>
             <a:endParaRPr lang="fr-FR"/>
           </a:p>
@@ -1411,7 +1411,7 @@
           <a:p>
             <a:fld id="{D95F3F3F-3E05-4475-BDF7-9F1F10448BC5}" type="datetimeFigureOut">
               <a:rPr lang="fr-FR" smtClean="0"/>
-              <a:t>21/01/2025</a:t>
+              <a:t>24/01/2025</a:t>
             </a:fld>
             <a:endParaRPr lang="fr-FR"/>
           </a:p>
@@ -1823,7 +1823,7 @@
           <a:p>
             <a:fld id="{D95F3F3F-3E05-4475-BDF7-9F1F10448BC5}" type="datetimeFigureOut">
               <a:rPr lang="fr-FR" smtClean="0"/>
-              <a:t>21/01/2025</a:t>
+              <a:t>24/01/2025</a:t>
             </a:fld>
             <a:endParaRPr lang="fr-FR"/>
           </a:p>
@@ -1964,7 +1964,7 @@
           <a:p>
             <a:fld id="{D95F3F3F-3E05-4475-BDF7-9F1F10448BC5}" type="datetimeFigureOut">
               <a:rPr lang="fr-FR" smtClean="0"/>
-              <a:t>21/01/2025</a:t>
+              <a:t>24/01/2025</a:t>
             </a:fld>
             <a:endParaRPr lang="fr-FR"/>
           </a:p>
@@ -2077,7 +2077,7 @@
           <a:p>
             <a:fld id="{D95F3F3F-3E05-4475-BDF7-9F1F10448BC5}" type="datetimeFigureOut">
               <a:rPr lang="fr-FR" smtClean="0"/>
-              <a:t>21/01/2025</a:t>
+              <a:t>24/01/2025</a:t>
             </a:fld>
             <a:endParaRPr lang="fr-FR"/>
           </a:p>
@@ -2388,7 +2388,7 @@
           <a:p>
             <a:fld id="{D95F3F3F-3E05-4475-BDF7-9F1F10448BC5}" type="datetimeFigureOut">
               <a:rPr lang="fr-FR" smtClean="0"/>
-              <a:t>21/01/2025</a:t>
+              <a:t>24/01/2025</a:t>
             </a:fld>
             <a:endParaRPr lang="fr-FR"/>
           </a:p>
@@ -2676,7 +2676,7 @@
           <a:p>
             <a:fld id="{D95F3F3F-3E05-4475-BDF7-9F1F10448BC5}" type="datetimeFigureOut">
               <a:rPr lang="fr-FR" smtClean="0"/>
-              <a:t>21/01/2025</a:t>
+              <a:t>24/01/2025</a:t>
             </a:fld>
             <a:endParaRPr lang="fr-FR"/>
           </a:p>
@@ -2917,7 +2917,7 @@
           <a:p>
             <a:fld id="{D95F3F3F-3E05-4475-BDF7-9F1F10448BC5}" type="datetimeFigureOut">
               <a:rPr lang="fr-FR" smtClean="0"/>
-              <a:t>21/01/2025</a:t>
+              <a:t>24/01/2025</a:t>
             </a:fld>
             <a:endParaRPr lang="fr-FR"/>
           </a:p>
@@ -3794,8 +3794,8 @@
         </p:blipFill>
         <p:spPr>
           <a:xfrm>
-            <a:off x="4330903" y="2939677"/>
-            <a:ext cx="480925" cy="458024"/>
+            <a:off x="4354716" y="2958724"/>
+            <a:ext cx="431597" cy="411045"/>
           </a:xfrm>
           <a:prstGeom prst="rect">
             <a:avLst/>
@@ -5233,42 +5233,6 @@
           </a:prstGeom>
         </p:spPr>
       </p:pic>
-      <p:pic>
-        <p:nvPicPr>
-          <p:cNvPr id="50" name="Image 49">
-            <a:extLst>
-              <a:ext uri="{FF2B5EF4-FFF2-40B4-BE49-F238E27FC236}">
-                <a16:creationId xmlns:a16="http://schemas.microsoft.com/office/drawing/2014/main" id="{77743310-56F6-461D-80CB-F6071C359118}"/>
-              </a:ext>
-            </a:extLst>
-          </p:cNvPr>
-          <p:cNvPicPr>
-            <a:picLocks noChangeAspect="1"/>
-          </p:cNvPicPr>
-          <p:nvPr/>
-        </p:nvPicPr>
-        <p:blipFill>
-          <a:blip r:embed="rId3" cstate="hqprint">
-            <a:extLst>
-              <a:ext uri="{28A0092B-C50C-407E-A947-70E740481C1C}">
-                <a14:useLocalDpi xmlns:a14="http://schemas.microsoft.com/office/drawing/2010/main" val="0"/>
-              </a:ext>
-            </a:extLst>
-          </a:blip>
-          <a:stretch>
-            <a:fillRect/>
-          </a:stretch>
-        </p:blipFill>
-        <p:spPr>
-          <a:xfrm>
-            <a:off x="4848296" y="2964706"/>
-            <a:ext cx="494322" cy="388289"/>
-          </a:xfrm>
-          <a:prstGeom prst="rect">
-            <a:avLst/>
-          </a:prstGeom>
-        </p:spPr>
-      </p:pic>
       <p:sp>
         <p:nvSpPr>
           <p:cNvPr id="53" name="ZoneTexte 52">
@@ -5340,7 +5304,7 @@
         </p:nvSpPr>
         <p:spPr>
           <a:xfrm>
-            <a:off x="5393409" y="3366907"/>
+            <a:off x="6148881" y="3563435"/>
             <a:ext cx="1272579" cy="369332"/>
           </a:xfrm>
           <a:prstGeom prst="rect">
@@ -5382,6 +5346,36 @@
           </a:p>
         </p:txBody>
       </p:sp>
+      <p:pic>
+        <p:nvPicPr>
+          <p:cNvPr id="9" name="Image 8"/>
+          <p:cNvPicPr>
+            <a:picLocks noChangeAspect="1"/>
+          </p:cNvPicPr>
+          <p:nvPr/>
+        </p:nvPicPr>
+        <p:blipFill>
+          <a:blip r:embed="rId16">
+            <a:extLst>
+              <a:ext uri="{28A0092B-C50C-407E-A947-70E740481C1C}">
+                <a14:useLocalDpi xmlns:a14="http://schemas.microsoft.com/office/drawing/2010/main" val="0"/>
+              </a:ext>
+            </a:extLst>
+          </a:blip>
+          <a:stretch>
+            <a:fillRect/>
+          </a:stretch>
+        </p:blipFill>
+        <p:spPr>
+          <a:xfrm>
+            <a:off x="4820245" y="2968639"/>
+            <a:ext cx="381053" cy="381053"/>
+          </a:xfrm>
+          <a:prstGeom prst="rect">
+            <a:avLst/>
+          </a:prstGeom>
+        </p:spPr>
+      </p:pic>
     </p:spTree>
     <p:extLst>
       <p:ext uri="{BB962C8B-B14F-4D97-AF65-F5344CB8AC3E}">

</xml_diff>